<commit_message>
[update] final summary prompt,ppt tool layout, split cross_silo into ask and evaluate parts
</commit_message>
<xml_diff>
--- a/strategy_report.pptx
+++ b/strategy_report.pptx
@@ -6,6 +6,12 @@
   </p:sldMasterIdLst>
   <p:sldIdLst>
     <p:sldId id="256" r:id="rId7"/>
+    <p:sldId id="257" r:id="rId8"/>
+    <p:sldId id="258" r:id="rId9"/>
+    <p:sldId id="259" r:id="rId10"/>
+    <p:sldId id="260" r:id="rId11"/>
+    <p:sldId id="261" r:id="rId12"/>
+    <p:sldId id="262" r:id="rId13"/>
   </p:sldIdLst>
   <p:sldSz cx="9144000" cy="6858000" type="screen4x3"/>
   <p:notesSz cx="6858000" cy="9144000"/>
@@ -3095,6 +3101,62 @@
             <a:spLocks noGrp="1"/>
           </p:cNvSpPr>
           <p:nvPr>
+            <p:ph type="ctrTitle"/>
+          </p:nvPr>
+        </p:nvSpPr>
+        <p:spPr/>
+        <p:txBody>
+          <a:bodyPr/>
+          <a:lstStyle/>
+          <a:p>
+            <a:r>
+              <a:t>在筆電生產效率遇到瓶頸且人工組裝速度較慢的情境下，如何通過導入AI技術來提升生產效率10%？</a:t>
+            </a:r>
+          </a:p>
+        </p:txBody>
+      </p:sp>
+      <p:sp>
+        <p:nvSpPr>
+          <p:cNvPr id="3" name="Subtitle 2"/>
+          <p:cNvSpPr>
+            <a:spLocks noGrp="1"/>
+          </p:cNvSpPr>
+          <p:nvPr>
+            <p:ph type="subTitle" idx="1"/>
+          </p:nvPr>
+        </p:nvSpPr>
+        <p:spPr/>
+        <p:txBody>
+          <a:bodyPr/>
+          <a:lstStyle/>
+          <a:p/>
+        </p:txBody>
+      </p:sp>
+    </p:spTree>
+  </p:cSld>
+  <p:clrMapOvr>
+    <a:masterClrMapping/>
+  </p:clrMapOvr>
+</p:sld>
+</file>
+
+<file path=ppt/slides/slide2.xml><?xml version="1.0" encoding="utf-8"?>
+<p:sld xmlns:a="http://schemas.openxmlformats.org/drawingml/2006/main" xmlns:p="http://schemas.openxmlformats.org/presentationml/2006/main" xmlns:r="http://schemas.openxmlformats.org/officeDocument/2006/relationships">
+  <p:cSld>
+    <p:spTree>
+      <p:nvGrpSpPr>
+        <p:cNvPr id="1" name=""/>
+        <p:cNvGrpSpPr/>
+        <p:nvPr/>
+      </p:nvGrpSpPr>
+      <p:grpSpPr/>
+      <p:sp>
+        <p:nvSpPr>
+          <p:cNvPr id="2" name="Title 1"/>
+          <p:cNvSpPr>
+            <a:spLocks noGrp="1"/>
+          </p:cNvSpPr>
+          <p:nvPr>
             <p:ph type="title"/>
           </p:nvPr>
         </p:nvSpPr>
@@ -3104,7 +3166,7 @@
           <a:lstStyle/>
           <a:p>
             <a:r>
-              <a:t>提升徵信效率的AI解決方案</a:t>
+              <a:t>目標</a:t>
             </a:r>
           </a:p>
         </p:txBody>
@@ -3125,28 +3187,409 @@
           <a:lstStyle/>
           <a:p/>
           <a:p>
-            <a:r>
-              <a:t>目標設定：實現徵信作業所需時間降低50%以上。</a:t>
-            </a:r>
-          </a:p>
-          <a:p>
-            <a:r>
-              <a:t>部門協作需求：資訊部門開發爬蟲，法金部門提供資料需求，法規部門進行合規審查。</a:t>
-            </a:r>
-          </a:p>
-          <a:p>
-            <a:r>
-              <a:t>溝通與協調流程：定期會議、資訊共享平台、需求追蹤工具。</a:t>
-            </a:r>
-          </a:p>
-          <a:p>
-            <a:r>
-              <a:t>實施步驟：需求收集、爬蟲開發、合規審查、實施與監控。</a:t>
-            </a:r>
-          </a:p>
-          <a:p>
-            <a:r>
-              <a:t>目標評估：設定KPIs及定期檢討以確保進度。</a:t>
+            <a:pPr/>
+            <a:r>
+              <a:t>主動識別並解決人工組裝過程中的不效率問題。</a:t>
+            </a:r>
+          </a:p>
+          <a:p>
+            <a:pPr/>
+            <a:r>
+              <a:t>利用AI技術優化生產流程，並實現可持續的效率提升。</a:t>
+            </a:r>
+          </a:p>
+          <a:p>
+            <a:pPr/>
+            <a:r>
+              <a:t>促進跨部門合作，確保技術導入的成功。</a:t>
+            </a:r>
+          </a:p>
+        </p:txBody>
+      </p:sp>
+    </p:spTree>
+  </p:cSld>
+  <p:clrMapOvr>
+    <a:masterClrMapping/>
+  </p:clrMapOvr>
+</p:sld>
+</file>
+
+<file path=ppt/slides/slide3.xml><?xml version="1.0" encoding="utf-8"?>
+<p:sld xmlns:a="http://schemas.openxmlformats.org/drawingml/2006/main" xmlns:p="http://schemas.openxmlformats.org/presentationml/2006/main" xmlns:r="http://schemas.openxmlformats.org/officeDocument/2006/relationships">
+  <p:cSld>
+    <p:spTree>
+      <p:nvGrpSpPr>
+        <p:cNvPr id="1" name=""/>
+        <p:cNvGrpSpPr/>
+        <p:nvPr/>
+      </p:nvGrpSpPr>
+      <p:grpSpPr/>
+      <p:sp>
+        <p:nvSpPr>
+          <p:cNvPr id="2" name="Title 1"/>
+          <p:cNvSpPr>
+            <a:spLocks noGrp="1"/>
+          </p:cNvSpPr>
+          <p:nvPr>
+            <p:ph type="title"/>
+          </p:nvPr>
+        </p:nvSpPr>
+        <p:spPr/>
+        <p:txBody>
+          <a:bodyPr/>
+          <a:lstStyle/>
+          <a:p>
+            <a:r>
+              <a:t>梯形分析：尋找問題甜蜜點</a:t>
+            </a:r>
+          </a:p>
+        </p:txBody>
+      </p:sp>
+      <p:sp>
+        <p:nvSpPr>
+          <p:cNvPr id="3" name="Content Placeholder 2"/>
+          <p:cNvSpPr>
+            <a:spLocks noGrp="1"/>
+          </p:cNvSpPr>
+          <p:nvPr>
+            <p:ph idx="1"/>
+          </p:nvPr>
+        </p:nvSpPr>
+        <p:spPr/>
+        <p:txBody>
+          <a:bodyPr/>
+          <a:lstStyle/>
+          <a:p/>
+          <a:p>
+            <a:pPr/>
+            <a:r>
+              <a:t>我們如何提升筆電的整體生產效率？</a:t>
+            </a:r>
+          </a:p>
+          <a:p>
+            <a:pPr/>
+            <a:r>
+              <a:t>我們如何提升生產流程中每個組裝工序的效率？</a:t>
+            </a:r>
+          </a:p>
+          <a:p>
+            <a:pPr/>
+            <a:r>
+              <a:t>我們如何通過自動化與AI技術來替代或加速人工組裝？</a:t>
+            </a:r>
+          </a:p>
+        </p:txBody>
+      </p:sp>
+    </p:spTree>
+  </p:cSld>
+  <p:clrMapOvr>
+    <a:masterClrMapping/>
+  </p:clrMapOvr>
+</p:sld>
+</file>
+
+<file path=ppt/slides/slide4.xml><?xml version="1.0" encoding="utf-8"?>
+<p:sld xmlns:a="http://schemas.openxmlformats.org/drawingml/2006/main" xmlns:p="http://schemas.openxmlformats.org/presentationml/2006/main" xmlns:r="http://schemas.openxmlformats.org/officeDocument/2006/relationships">
+  <p:cSld>
+    <p:spTree>
+      <p:nvGrpSpPr>
+        <p:cNvPr id="1" name=""/>
+        <p:cNvGrpSpPr/>
+        <p:nvPr/>
+      </p:nvGrpSpPr>
+      <p:grpSpPr/>
+      <p:sp>
+        <p:nvSpPr>
+          <p:cNvPr id="2" name="Title 1"/>
+          <p:cNvSpPr>
+            <a:spLocks noGrp="1"/>
+          </p:cNvSpPr>
+          <p:nvPr>
+            <p:ph type="title"/>
+          </p:nvPr>
+        </p:nvSpPr>
+        <p:spPr/>
+        <p:txBody>
+          <a:bodyPr/>
+          <a:lstStyle/>
+          <a:p>
+            <a:r>
+              <a:t>痛點</a:t>
+            </a:r>
+          </a:p>
+        </p:txBody>
+      </p:sp>
+      <p:sp>
+        <p:nvSpPr>
+          <p:cNvPr id="3" name="Content Placeholder 2"/>
+          <p:cNvSpPr>
+            <a:spLocks noGrp="1"/>
+          </p:cNvSpPr>
+          <p:nvPr>
+            <p:ph idx="1"/>
+          </p:nvPr>
+        </p:nvSpPr>
+        <p:spPr/>
+        <p:txBody>
+          <a:bodyPr/>
+          <a:lstStyle/>
+          <a:p/>
+          <a:p>
+            <a:pPr/>
+            <a:r>
+              <a:t>人工組裝速度慢，易造成生產延遲。</a:t>
+            </a:r>
+          </a:p>
+          <a:p>
+            <a:pPr/>
+            <a:r>
+              <a:t>現有生產流程缺乏數據支持，導致難以進行效率分析與優化。</a:t>
+            </a:r>
+          </a:p>
+          <a:p>
+            <a:pPr/>
+            <a:r>
+              <a:t>對於AI技術的認知不足，許多員工對於新技術的抗拒態度。</a:t>
+            </a:r>
+          </a:p>
+        </p:txBody>
+      </p:sp>
+    </p:spTree>
+  </p:cSld>
+  <p:clrMapOvr>
+    <a:masterClrMapping/>
+  </p:clrMapOvr>
+</p:sld>
+</file>
+
+<file path=ppt/slides/slide5.xml><?xml version="1.0" encoding="utf-8"?>
+<p:sld xmlns:a="http://schemas.openxmlformats.org/drawingml/2006/main" xmlns:p="http://schemas.openxmlformats.org/presentationml/2006/main" xmlns:r="http://schemas.openxmlformats.org/officeDocument/2006/relationships">
+  <p:cSld>
+    <p:spTree>
+      <p:nvGrpSpPr>
+        <p:cNvPr id="1" name=""/>
+        <p:cNvGrpSpPr/>
+        <p:nvPr/>
+      </p:nvGrpSpPr>
+      <p:grpSpPr/>
+      <p:sp>
+        <p:nvSpPr>
+          <p:cNvPr id="2" name="Title 1"/>
+          <p:cNvSpPr>
+            <a:spLocks noGrp="1"/>
+          </p:cNvSpPr>
+          <p:nvPr>
+            <p:ph type="title"/>
+          </p:nvPr>
+        </p:nvSpPr>
+        <p:spPr/>
+        <p:txBody>
+          <a:bodyPr/>
+          <a:lstStyle/>
+          <a:p>
+            <a:r>
+              <a:t>跨部門視角的整合分析</a:t>
+            </a:r>
+          </a:p>
+        </p:txBody>
+      </p:sp>
+      <p:sp>
+        <p:nvSpPr>
+          <p:cNvPr id="3" name="Content Placeholder 2"/>
+          <p:cNvSpPr>
+            <a:spLocks noGrp="1"/>
+          </p:cNvSpPr>
+          <p:nvPr>
+            <p:ph idx="1"/>
+          </p:nvPr>
+        </p:nvSpPr>
+        <p:spPr/>
+        <p:txBody>
+          <a:bodyPr/>
+          <a:lstStyle/>
+          <a:p/>
+          <a:p>
+            <a:pPr/>
+            <a:r>
+              <a:t>總經理：導入AI技術將提升整體生產力，替公司創造競爭優勢，並提高市場份額。</a:t>
+            </a:r>
+          </a:p>
+          <a:p>
+            <a:pPr/>
+            <a:r>
+              <a:t>生產部門：需針對現有流程進行數據收集，分析瓶頸之處，提供合適的數據支持。</a:t>
+            </a:r>
+          </a:p>
+          <a:p>
+            <a:pPr/>
+            <a:r>
+              <a:t>IT部門：需掌握開發機械手臂的技術，並聯繫外部資源以獲取AI系統的開發支持。</a:t>
+            </a:r>
+          </a:p>
+          <a:p>
+            <a:pPr/>
+            <a:r>
+              <a:t>人力資源部門：需針對員工進行必要的AI技術和自動化操作培訓，以降低對新技術的抵抗。</a:t>
+            </a:r>
+          </a:p>
+        </p:txBody>
+      </p:sp>
+    </p:spTree>
+  </p:cSld>
+  <p:clrMapOvr>
+    <a:masterClrMapping/>
+  </p:clrMapOvr>
+</p:sld>
+</file>
+
+<file path=ppt/slides/slide6.xml><?xml version="1.0" encoding="utf-8"?>
+<p:sld xmlns:a="http://schemas.openxmlformats.org/drawingml/2006/main" xmlns:p="http://schemas.openxmlformats.org/presentationml/2006/main" xmlns:r="http://schemas.openxmlformats.org/officeDocument/2006/relationships">
+  <p:cSld>
+    <p:spTree>
+      <p:nvGrpSpPr>
+        <p:cNvPr id="1" name=""/>
+        <p:cNvGrpSpPr/>
+        <p:nvPr/>
+      </p:nvGrpSpPr>
+      <p:grpSpPr/>
+      <p:sp>
+        <p:nvSpPr>
+          <p:cNvPr id="2" name="Title 1"/>
+          <p:cNvSpPr>
+            <a:spLocks noGrp="1"/>
+          </p:cNvSpPr>
+          <p:nvPr>
+            <p:ph type="title"/>
+          </p:nvPr>
+        </p:nvSpPr>
+        <p:spPr/>
+        <p:txBody>
+          <a:bodyPr/>
+          <a:lstStyle/>
+          <a:p>
+            <a:r>
+              <a:t>實作步驟</a:t>
+            </a:r>
+          </a:p>
+        </p:txBody>
+      </p:sp>
+      <p:sp>
+        <p:nvSpPr>
+          <p:cNvPr id="3" name="Content Placeholder 2"/>
+          <p:cNvSpPr>
+            <a:spLocks noGrp="1"/>
+          </p:cNvSpPr>
+          <p:nvPr>
+            <p:ph idx="1"/>
+          </p:nvPr>
+        </p:nvSpPr>
+        <p:spPr/>
+        <p:txBody>
+          <a:bodyPr/>
+          <a:lstStyle/>
+          <a:p/>
+          <a:p>
+            <a:pPr/>
+            <a:r>
+              <a:t>需求分析：各部門會議，確定AI導入的具體需求與目標。</a:t>
+            </a:r>
+          </a:p>
+          <a:p>
+            <a:pPr/>
+            <a:r>
+              <a:t>數據收集：生產部門提供現有流程的數據，IT部門分析數據以找出關鍵問題。</a:t>
+            </a:r>
+          </a:p>
+          <a:p>
+            <a:pPr/>
+            <a:r>
+              <a:t>技術開發：IT部門與AI公司合作，開發機械手臂及AI系統，針對特定組裝工序進行優化。</a:t>
+            </a:r>
+          </a:p>
+          <a:p>
+            <a:pPr/>
+            <a:r>
+              <a:t>員工培訓：人力資源部門組織培訓，引導員工熟悉新技術與工具的使用。</a:t>
+            </a:r>
+          </a:p>
+          <a:p>
+            <a:pPr/>
+            <a:r>
+              <a:t>階段性評估：在導入過程中持續監測進展，根據數據分析及時調整策略以達成預期的效率提升。</a:t>
+            </a:r>
+          </a:p>
+        </p:txBody>
+      </p:sp>
+    </p:spTree>
+  </p:cSld>
+  <p:clrMapOvr>
+    <a:masterClrMapping/>
+  </p:clrMapOvr>
+</p:sld>
+</file>
+
+<file path=ppt/slides/slide7.xml><?xml version="1.0" encoding="utf-8"?>
+<p:sld xmlns:a="http://schemas.openxmlformats.org/drawingml/2006/main" xmlns:p="http://schemas.openxmlformats.org/presentationml/2006/main" xmlns:r="http://schemas.openxmlformats.org/officeDocument/2006/relationships">
+  <p:cSld>
+    <p:spTree>
+      <p:nvGrpSpPr>
+        <p:cNvPr id="1" name=""/>
+        <p:cNvGrpSpPr/>
+        <p:nvPr/>
+      </p:nvGrpSpPr>
+      <p:grpSpPr/>
+      <p:sp>
+        <p:nvSpPr>
+          <p:cNvPr id="2" name="Title 1"/>
+          <p:cNvSpPr>
+            <a:spLocks noGrp="1"/>
+          </p:cNvSpPr>
+          <p:nvPr>
+            <p:ph type="title"/>
+          </p:nvPr>
+        </p:nvSpPr>
+        <p:spPr/>
+        <p:txBody>
+          <a:bodyPr/>
+          <a:lstStyle/>
+          <a:p>
+            <a:r>
+              <a:t>結論</a:t>
+            </a:r>
+          </a:p>
+        </p:txBody>
+      </p:sp>
+      <p:sp>
+        <p:nvSpPr>
+          <p:cNvPr id="3" name="Content Placeholder 2"/>
+          <p:cNvSpPr>
+            <a:spLocks noGrp="1"/>
+          </p:cNvSpPr>
+          <p:nvPr>
+            <p:ph idx="1"/>
+          </p:nvPr>
+        </p:nvSpPr>
+        <p:spPr/>
+        <p:txBody>
+          <a:bodyPr/>
+          <a:lstStyle/>
+          <a:p/>
+          <a:p>
+            <a:pPr/>
+            <a:r>
+              <a:t>通過以上策略和實作步驟，筆電的生產效率有望在導入AI技術後提升10%。</a:t>
+            </a:r>
+          </a:p>
+          <a:p>
+            <a:pPr/>
+            <a:r>
+              <a:t>各部門的協同合作是成功的關鍵，特別是生產部門的數據支持和IT部門的技術開發。</a:t>
+            </a:r>
+          </a:p>
+          <a:p>
+            <a:pPr/>
+            <a:r>
+              <a:t>確保員工的適應性與接受度將直接影響AI實施的成效，因此必須重視培訓與支持。</a:t>
             </a:r>
           </a:p>
         </p:txBody>

</xml_diff>